<commit_message>
minor modification to presentation slide 2
</commit_message>
<xml_diff>
--- a/Group2Presentation.pptx
+++ b/Group2Presentation.pptx
@@ -108,6 +108,11 @@
       </a:defRPr>
     </a:lvl9pPr>
   </p:defaultTextStyle>
+  <p:extLst>
+    <p:ext uri="{EFAFB233-063F-42B5-8137-9DF3F51BA10A}">
+      <p15:sldGuideLst xmlns:p15="http://schemas.microsoft.com/office/powerpoint/2012/main"/>
+    </p:ext>
+  </p:extLst>
 </p:presentation>
 </file>
 
@@ -124,12 +129,12 @@
   <pc:docChgLst>
     <pc:chgData name="Karen Jewell" userId="b7e4705127bdb922" providerId="LiveId" clId="{CC92DE7A-9D2C-4D69-A667-C51CA7EA785A}"/>
     <pc:docChg chg="undo custSel addSld modSld">
-      <pc:chgData name="Karen Jewell" userId="b7e4705127bdb922" providerId="LiveId" clId="{CC92DE7A-9D2C-4D69-A667-C51CA7EA785A}" dt="2020-03-04T09:35:20.679" v="1928" actId="20577"/>
+      <pc:chgData name="Karen Jewell" userId="b7e4705127bdb922" providerId="LiveId" clId="{CC92DE7A-9D2C-4D69-A667-C51CA7EA785A}" dt="2020-03-04T13:36:35.367" v="1988" actId="5793"/>
       <pc:docMkLst>
         <pc:docMk/>
       </pc:docMkLst>
       <pc:sldChg chg="addSp delSp modSp mod">
-        <pc:chgData name="Karen Jewell" userId="b7e4705127bdb922" providerId="LiveId" clId="{CC92DE7A-9D2C-4D69-A667-C51CA7EA785A}" dt="2020-03-04T09:31:45.426" v="1873" actId="20577"/>
+        <pc:chgData name="Karen Jewell" userId="b7e4705127bdb922" providerId="LiveId" clId="{CC92DE7A-9D2C-4D69-A667-C51CA7EA785A}" dt="2020-03-04T13:36:18.200" v="1935" actId="27636"/>
         <pc:sldMkLst>
           <pc:docMk/>
           <pc:sldMk cId="384181669" sldId="256"/>
@@ -167,7 +172,7 @@
           </ac:spMkLst>
         </pc:spChg>
         <pc:spChg chg="add mod">
-          <ac:chgData name="Karen Jewell" userId="b7e4705127bdb922" providerId="LiveId" clId="{CC92DE7A-9D2C-4D69-A667-C51CA7EA785A}" dt="2020-03-04T09:31:45.426" v="1873" actId="20577"/>
+          <ac:chgData name="Karen Jewell" userId="b7e4705127bdb922" providerId="LiveId" clId="{CC92DE7A-9D2C-4D69-A667-C51CA7EA785A}" dt="2020-03-04T13:36:18.200" v="1935" actId="27636"/>
           <ac:spMkLst>
             <pc:docMk/>
             <pc:sldMk cId="384181669" sldId="256"/>
@@ -176,7 +181,7 @@
         </pc:spChg>
       </pc:sldChg>
       <pc:sldChg chg="addSp delSp modSp add mod">
-        <pc:chgData name="Karen Jewell" userId="b7e4705127bdb922" providerId="LiveId" clId="{CC92DE7A-9D2C-4D69-A667-C51CA7EA785A}" dt="2020-03-04T09:09:29.943" v="981" actId="20577"/>
+        <pc:chgData name="Karen Jewell" userId="b7e4705127bdb922" providerId="LiveId" clId="{CC92DE7A-9D2C-4D69-A667-C51CA7EA785A}" dt="2020-03-04T13:36:35.367" v="1988" actId="5793"/>
         <pc:sldMkLst>
           <pc:docMk/>
           <pc:sldMk cId="1946918776" sldId="257"/>
@@ -198,7 +203,7 @@
           </ac:spMkLst>
         </pc:spChg>
         <pc:spChg chg="add mod">
-          <ac:chgData name="Karen Jewell" userId="b7e4705127bdb922" providerId="LiveId" clId="{CC92DE7A-9D2C-4D69-A667-C51CA7EA785A}" dt="2020-03-04T09:09:29.943" v="981" actId="20577"/>
+          <ac:chgData name="Karen Jewell" userId="b7e4705127bdb922" providerId="LiveId" clId="{CC92DE7A-9D2C-4D69-A667-C51CA7EA785A}" dt="2020-03-04T13:36:35.367" v="1988" actId="5793"/>
           <ac:spMkLst>
             <pc:docMk/>
             <pc:sldMk cId="1946918776" sldId="257"/>
@@ -3586,7 +3591,7 @@
         <p:spPr/>
         <p:txBody>
           <a:bodyPr>
-            <a:normAutofit fontScale="92500"/>
+            <a:normAutofit lnSpcReduction="10000"/>
           </a:bodyPr>
           <a:lstStyle/>
           <a:p>
@@ -3600,9 +3605,6 @@
               <a:rPr lang="en-GB" dirty="0"/>
               <a:t>Why?</a:t>
             </a:r>
-          </a:p>
-          <a:p>
-            <a:endParaRPr lang="en-GB" dirty="0"/>
           </a:p>
           <a:p>
             <a:endParaRPr lang="en-GB" dirty="0"/>
@@ -3737,7 +3739,9 @@
         </p:nvSpPr>
         <p:spPr/>
         <p:txBody>
-          <a:bodyPr/>
+          <a:bodyPr>
+            <a:normAutofit fontScale="92500" lnSpcReduction="20000"/>
+          </a:bodyPr>
           <a:lstStyle/>
           <a:p>
             <a:r>
@@ -3793,6 +3797,16 @@
             <a:r>
               <a:rPr lang="en-GB" dirty="0"/>
               <a:t>Non-relevant data removed meaning no scope to explore beyond the article’s discussion itself</a:t>
+            </a:r>
+          </a:p>
+          <a:p>
+            <a:pPr lvl="1"/>
+            <a:endParaRPr lang="en-GB" dirty="0"/>
+          </a:p>
+          <a:p>
+            <a:r>
+              <a:rPr lang="en-GB" dirty="0"/>
+              <a:t>We had a lot of references, but no hypothesis…</a:t>
             </a:r>
           </a:p>
         </p:txBody>

</xml_diff>

<commit_message>
Updates to Presentation File
</commit_message>
<xml_diff>
--- a/Group2Presentation.pptx
+++ b/Group2Presentation.pptx
@@ -4,6 +4,9 @@
   <p:sldMasterIdLst>
     <p:sldMasterId id="2147483648" r:id="rId1"/>
   </p:sldMasterIdLst>
+  <p:notesMasterIdLst>
+    <p:notesMasterId r:id="rId7"/>
+  </p:notesMasterIdLst>
   <p:sldIdLst>
     <p:sldId id="256" r:id="rId2"/>
     <p:sldId id="257" r:id="rId3"/>
@@ -119,7 +122,7 @@
 <file path=ppt/revisionInfo.xml><?xml version="1.0" encoding="utf-8"?>
 <p1510:revInfo xmlns:a="http://schemas.openxmlformats.org/drawingml/2006/main" xmlns:r="http://schemas.openxmlformats.org/officeDocument/2006/relationships" xmlns:p1510="http://schemas.microsoft.com/office/powerpoint/2015/10/main">
   <p1510:revLst>
-    <p1510:client id="{CC92DE7A-9D2C-4D69-A667-C51CA7EA785A}" v="7" dt="2020-03-04T09:05:22.462"/>
+    <p1510:client id="{CC92DE7A-9D2C-4D69-A667-C51CA7EA785A}" v="56" dt="2020-03-11T10:27:18.077"/>
   </p1510:revLst>
 </p1510:revInfo>
 </file>
@@ -128,13 +131,13 @@
 <pc:chgInfo xmlns:a="http://schemas.openxmlformats.org/drawingml/2006/main" xmlns:r="http://schemas.openxmlformats.org/officeDocument/2006/relationships" xmlns:ac="http://schemas.microsoft.com/office/drawing/2013/main/command" xmlns:pc="http://schemas.microsoft.com/office/powerpoint/2013/main/command">
   <pc:docChgLst>
     <pc:chgData name="Karen Jewell" userId="b7e4705127bdb922" providerId="LiveId" clId="{CC92DE7A-9D2C-4D69-A667-C51CA7EA785A}"/>
-    <pc:docChg chg="undo custSel addSld modSld">
-      <pc:chgData name="Karen Jewell" userId="b7e4705127bdb922" providerId="LiveId" clId="{CC92DE7A-9D2C-4D69-A667-C51CA7EA785A}" dt="2020-03-04T13:36:35.367" v="1988" actId="5793"/>
+    <pc:docChg chg="undo custSel addSld modSld modMainMaster">
+      <pc:chgData name="Karen Jewell" userId="b7e4705127bdb922" providerId="LiveId" clId="{CC92DE7A-9D2C-4D69-A667-C51CA7EA785A}" dt="2020-03-11T10:27:18.075" v="2550"/>
       <pc:docMkLst>
         <pc:docMk/>
       </pc:docMkLst>
-      <pc:sldChg chg="addSp delSp modSp mod">
-        <pc:chgData name="Karen Jewell" userId="b7e4705127bdb922" providerId="LiveId" clId="{CC92DE7A-9D2C-4D69-A667-C51CA7EA785A}" dt="2020-03-04T13:36:18.200" v="1935" actId="27636"/>
+      <pc:sldChg chg="addSp delSp modSp mod modNotes">
+        <pc:chgData name="Karen Jewell" userId="b7e4705127bdb922" providerId="LiveId" clId="{CC92DE7A-9D2C-4D69-A667-C51CA7EA785A}" dt="2020-03-10T14:36:03.184" v="2549" actId="20577"/>
         <pc:sldMkLst>
           <pc:docMk/>
           <pc:sldMk cId="384181669" sldId="256"/>
@@ -172,7 +175,7 @@
           </ac:spMkLst>
         </pc:spChg>
         <pc:spChg chg="add mod">
-          <ac:chgData name="Karen Jewell" userId="b7e4705127bdb922" providerId="LiveId" clId="{CC92DE7A-9D2C-4D69-A667-C51CA7EA785A}" dt="2020-03-04T13:36:18.200" v="1935" actId="27636"/>
+          <ac:chgData name="Karen Jewell" userId="b7e4705127bdb922" providerId="LiveId" clId="{CC92DE7A-9D2C-4D69-A667-C51CA7EA785A}" dt="2020-03-10T13:26:37.405" v="2499" actId="20577"/>
           <ac:spMkLst>
             <pc:docMk/>
             <pc:sldMk cId="384181669" sldId="256"/>
@@ -181,7 +184,7 @@
         </pc:spChg>
       </pc:sldChg>
       <pc:sldChg chg="addSp delSp modSp add mod">
-        <pc:chgData name="Karen Jewell" userId="b7e4705127bdb922" providerId="LiveId" clId="{CC92DE7A-9D2C-4D69-A667-C51CA7EA785A}" dt="2020-03-04T13:36:35.367" v="1988" actId="5793"/>
+        <pc:chgData name="Karen Jewell" userId="b7e4705127bdb922" providerId="LiveId" clId="{CC92DE7A-9D2C-4D69-A667-C51CA7EA785A}" dt="2020-03-10T13:24:22.683" v="2419" actId="20577"/>
         <pc:sldMkLst>
           <pc:docMk/>
           <pc:sldMk cId="1946918776" sldId="257"/>
@@ -203,7 +206,7 @@
           </ac:spMkLst>
         </pc:spChg>
         <pc:spChg chg="add mod">
-          <ac:chgData name="Karen Jewell" userId="b7e4705127bdb922" providerId="LiveId" clId="{CC92DE7A-9D2C-4D69-A667-C51CA7EA785A}" dt="2020-03-04T13:36:35.367" v="1988" actId="5793"/>
+          <ac:chgData name="Karen Jewell" userId="b7e4705127bdb922" providerId="LiveId" clId="{CC92DE7A-9D2C-4D69-A667-C51CA7EA785A}" dt="2020-03-10T13:24:22.683" v="2419" actId="20577"/>
           <ac:spMkLst>
             <pc:docMk/>
             <pc:sldMk cId="1946918776" sldId="257"/>
@@ -212,7 +215,7 @@
         </pc:spChg>
       </pc:sldChg>
       <pc:sldChg chg="addSp delSp modSp add mod">
-        <pc:chgData name="Karen Jewell" userId="b7e4705127bdb922" providerId="LiveId" clId="{CC92DE7A-9D2C-4D69-A667-C51CA7EA785A}" dt="2020-03-04T09:31:21.937" v="1866" actId="20577"/>
+        <pc:chgData name="Karen Jewell" userId="b7e4705127bdb922" providerId="LiveId" clId="{CC92DE7A-9D2C-4D69-A667-C51CA7EA785A}" dt="2020-03-11T10:27:18.075" v="2550"/>
         <pc:sldMkLst>
           <pc:docMk/>
           <pc:sldMk cId="1394511912" sldId="258"/>
@@ -226,7 +229,7 @@
           </ac:spMkLst>
         </pc:spChg>
         <pc:spChg chg="add mod">
-          <ac:chgData name="Karen Jewell" userId="b7e4705127bdb922" providerId="LiveId" clId="{CC92DE7A-9D2C-4D69-A667-C51CA7EA785A}" dt="2020-03-04T09:10:16.604" v="1002" actId="20577"/>
+          <ac:chgData name="Karen Jewell" userId="b7e4705127bdb922" providerId="LiveId" clId="{CC92DE7A-9D2C-4D69-A667-C51CA7EA785A}" dt="2020-03-10T13:22:27.365" v="2337" actId="1076"/>
           <ac:spMkLst>
             <pc:docMk/>
             <pc:sldMk cId="1394511912" sldId="258"/>
@@ -234,16 +237,48 @@
           </ac:spMkLst>
         </pc:spChg>
         <pc:spChg chg="add mod">
-          <ac:chgData name="Karen Jewell" userId="b7e4705127bdb922" providerId="LiveId" clId="{CC92DE7A-9D2C-4D69-A667-C51CA7EA785A}" dt="2020-03-04T09:31:21.937" v="1866" actId="20577"/>
+          <ac:chgData name="Karen Jewell" userId="b7e4705127bdb922" providerId="LiveId" clId="{CC92DE7A-9D2C-4D69-A667-C51CA7EA785A}" dt="2020-03-10T13:21:31.756" v="2320" actId="14100"/>
           <ac:spMkLst>
             <pc:docMk/>
             <pc:sldMk cId="1394511912" sldId="258"/>
             <ac:spMk id="4" creationId="{A7E00B22-6E76-4776-8880-0C773DA469B9}"/>
           </ac:spMkLst>
         </pc:spChg>
+        <pc:spChg chg="add del mod">
+          <ac:chgData name="Karen Jewell" userId="b7e4705127bdb922" providerId="LiveId" clId="{CC92DE7A-9D2C-4D69-A667-C51CA7EA785A}" dt="2020-03-11T10:27:18.075" v="2550"/>
+          <ac:spMkLst>
+            <pc:docMk/>
+            <pc:sldMk cId="1394511912" sldId="258"/>
+            <ac:spMk id="9" creationId="{C1471DBF-B409-4252-9AFF-5E6346D9C0E9}"/>
+          </ac:spMkLst>
+        </pc:spChg>
+        <pc:picChg chg="add mod">
+          <ac:chgData name="Karen Jewell" userId="b7e4705127bdb922" providerId="LiveId" clId="{CC92DE7A-9D2C-4D69-A667-C51CA7EA785A}" dt="2020-03-10T13:21:55.814" v="2326" actId="1076"/>
+          <ac:picMkLst>
+            <pc:docMk/>
+            <pc:sldMk cId="1394511912" sldId="258"/>
+            <ac:picMk id="5" creationId="{D9608F30-4868-4CD1-9506-4C1B6D1BB464}"/>
+          </ac:picMkLst>
+        </pc:picChg>
+        <pc:picChg chg="add del mod">
+          <ac:chgData name="Karen Jewell" userId="b7e4705127bdb922" providerId="LiveId" clId="{CC92DE7A-9D2C-4D69-A667-C51CA7EA785A}" dt="2020-03-10T09:31:49.873" v="1998" actId="478"/>
+          <ac:picMkLst>
+            <pc:docMk/>
+            <pc:sldMk cId="1394511912" sldId="258"/>
+            <ac:picMk id="7" creationId="{5B4E8DC6-7A5E-4655-9109-23173F2B567C}"/>
+          </ac:picMkLst>
+        </pc:picChg>
+        <pc:picChg chg="add mod">
+          <ac:chgData name="Karen Jewell" userId="b7e4705127bdb922" providerId="LiveId" clId="{CC92DE7A-9D2C-4D69-A667-C51CA7EA785A}" dt="2020-03-10T13:21:53.081" v="2325" actId="1076"/>
+          <ac:picMkLst>
+            <pc:docMk/>
+            <pc:sldMk cId="1394511912" sldId="258"/>
+            <ac:picMk id="8" creationId="{73434485-2054-4C2A-8549-A2A2A77A6FD3}"/>
+          </ac:picMkLst>
+        </pc:picChg>
       </pc:sldChg>
       <pc:sldChg chg="addSp delSp modSp add mod">
-        <pc:chgData name="Karen Jewell" userId="b7e4705127bdb922" providerId="LiveId" clId="{CC92DE7A-9D2C-4D69-A667-C51CA7EA785A}" dt="2020-03-04T09:35:20.679" v="1928" actId="20577"/>
+        <pc:chgData name="Karen Jewell" userId="b7e4705127bdb922" providerId="LiveId" clId="{CC92DE7A-9D2C-4D69-A667-C51CA7EA785A}" dt="2020-03-10T13:23:52.664" v="2405" actId="20577"/>
         <pc:sldMkLst>
           <pc:docMk/>
           <pc:sldMk cId="3068476550" sldId="259"/>
@@ -257,7 +292,7 @@
           </ac:spMkLst>
         </pc:spChg>
         <pc:spChg chg="add mod">
-          <ac:chgData name="Karen Jewell" userId="b7e4705127bdb922" providerId="LiveId" clId="{CC92DE7A-9D2C-4D69-A667-C51CA7EA785A}" dt="2020-03-04T09:15:37.758" v="1307" actId="20577"/>
+          <ac:chgData name="Karen Jewell" userId="b7e4705127bdb922" providerId="LiveId" clId="{CC92DE7A-9D2C-4D69-A667-C51CA7EA785A}" dt="2020-03-10T13:22:09.630" v="2333" actId="20577"/>
           <ac:spMkLst>
             <pc:docMk/>
             <pc:sldMk cId="3068476550" sldId="259"/>
@@ -265,16 +300,32 @@
           </ac:spMkLst>
         </pc:spChg>
         <pc:spChg chg="add mod">
-          <ac:chgData name="Karen Jewell" userId="b7e4705127bdb922" providerId="LiveId" clId="{CC92DE7A-9D2C-4D69-A667-C51CA7EA785A}" dt="2020-03-04T09:35:20.679" v="1928" actId="20577"/>
+          <ac:chgData name="Karen Jewell" userId="b7e4705127bdb922" providerId="LiveId" clId="{CC92DE7A-9D2C-4D69-A667-C51CA7EA785A}" dt="2020-03-10T13:23:52.664" v="2405" actId="20577"/>
           <ac:spMkLst>
             <pc:docMk/>
             <pc:sldMk cId="3068476550" sldId="259"/>
             <ac:spMk id="4" creationId="{30DA1BA1-41C3-4A24-BEBE-B2A8CDF3995C}"/>
           </ac:spMkLst>
         </pc:spChg>
+        <pc:picChg chg="add mod">
+          <ac:chgData name="Karen Jewell" userId="b7e4705127bdb922" providerId="LiveId" clId="{CC92DE7A-9D2C-4D69-A667-C51CA7EA785A}" dt="2020-03-10T09:33:10.697" v="2003" actId="1076"/>
+          <ac:picMkLst>
+            <pc:docMk/>
+            <pc:sldMk cId="3068476550" sldId="259"/>
+            <ac:picMk id="5" creationId="{6D970FCF-106C-48C6-BF85-1A384A0C52A5}"/>
+          </ac:picMkLst>
+        </pc:picChg>
+        <pc:picChg chg="add del mod">
+          <ac:chgData name="Karen Jewell" userId="b7e4705127bdb922" providerId="LiveId" clId="{CC92DE7A-9D2C-4D69-A667-C51CA7EA785A}" dt="2020-03-10T09:33:28.613" v="2006"/>
+          <ac:picMkLst>
+            <pc:docMk/>
+            <pc:sldMk cId="3068476550" sldId="259"/>
+            <ac:picMk id="1026" creationId="{CE90BB61-DCCF-4558-9546-0B05D53C5A47}"/>
+          </ac:picMkLst>
+        </pc:picChg>
       </pc:sldChg>
       <pc:sldChg chg="addSp delSp modSp add mod">
-        <pc:chgData name="Karen Jewell" userId="b7e4705127bdb922" providerId="LiveId" clId="{CC92DE7A-9D2C-4D69-A667-C51CA7EA785A}" dt="2020-03-04T09:15:45.761" v="1329" actId="20577"/>
+        <pc:chgData name="Karen Jewell" userId="b7e4705127bdb922" providerId="LiveId" clId="{CC92DE7A-9D2C-4D69-A667-C51CA7EA785A}" dt="2020-03-10T13:26:08.695" v="2479" actId="20577"/>
         <pc:sldMkLst>
           <pc:docMk/>
           <pc:sldMk cId="4169300532" sldId="260"/>
@@ -296,7 +347,7 @@
           </ac:spMkLst>
         </pc:spChg>
         <pc:spChg chg="add mod">
-          <ac:chgData name="Karen Jewell" userId="b7e4705127bdb922" providerId="LiveId" clId="{CC92DE7A-9D2C-4D69-A667-C51CA7EA785A}" dt="2020-03-04T09:00:14.875" v="6"/>
+          <ac:chgData name="Karen Jewell" userId="b7e4705127bdb922" providerId="LiveId" clId="{CC92DE7A-9D2C-4D69-A667-C51CA7EA785A}" dt="2020-03-10T13:26:08.695" v="2479" actId="20577"/>
           <ac:spMkLst>
             <pc:docMk/>
             <pc:sldMk cId="4169300532" sldId="260"/>
@@ -304,9 +355,809 @@
           </ac:spMkLst>
         </pc:spChg>
       </pc:sldChg>
+      <pc:sldMasterChg chg="addSldLayout modSldLayout">
+        <pc:chgData name="Karen Jewell" userId="b7e4705127bdb922" providerId="LiveId" clId="{CC92DE7A-9D2C-4D69-A667-C51CA7EA785A}" dt="2020-03-10T13:20:38.580" v="2318" actId="3064"/>
+        <pc:sldMasterMkLst>
+          <pc:docMk/>
+          <pc:sldMasterMk cId="4097537764" sldId="2147483648"/>
+        </pc:sldMasterMkLst>
+        <pc:sldLayoutChg chg="modSp new mod">
+          <pc:chgData name="Karen Jewell" userId="b7e4705127bdb922" providerId="LiveId" clId="{CC92DE7A-9D2C-4D69-A667-C51CA7EA785A}" dt="2020-03-10T13:20:38.580" v="2318" actId="3064"/>
+          <pc:sldLayoutMkLst>
+            <pc:docMk/>
+            <pc:sldMasterMk cId="4097537764" sldId="2147483648"/>
+            <pc:sldLayoutMk cId="4264740658" sldId="2147483660"/>
+          </pc:sldLayoutMkLst>
+          <pc:spChg chg="mod">
+            <ac:chgData name="Karen Jewell" userId="b7e4705127bdb922" providerId="LiveId" clId="{CC92DE7A-9D2C-4D69-A667-C51CA7EA785A}" dt="2020-03-10T13:20:38.580" v="2318" actId="3064"/>
+            <ac:spMkLst>
+              <pc:docMk/>
+              <pc:sldMasterMk cId="4097537764" sldId="2147483648"/>
+              <pc:sldLayoutMk cId="4264740658" sldId="2147483660"/>
+              <ac:spMk id="2" creationId="{9E7C72A3-B0D9-455C-BFF1-242AF861854A}"/>
+            </ac:spMkLst>
+          </pc:spChg>
+        </pc:sldLayoutChg>
+      </pc:sldMasterChg>
     </pc:docChg>
   </pc:docChgLst>
 </pc:chgInfo>
+</file>
+
+<file path=ppt/notesMasters/notesMaster1.xml><?xml version="1.0" encoding="utf-8"?>
+<p:notesMaster xmlns:a="http://schemas.openxmlformats.org/drawingml/2006/main" xmlns:r="http://schemas.openxmlformats.org/officeDocument/2006/relationships" xmlns:p="http://schemas.openxmlformats.org/presentationml/2006/main">
+  <p:cSld>
+    <p:bg>
+      <p:bgRef idx="1001">
+        <a:schemeClr val="bg1"/>
+      </p:bgRef>
+    </p:bg>
+    <p:spTree>
+      <p:nvGrpSpPr>
+        <p:cNvPr id="1" name=""/>
+        <p:cNvGrpSpPr/>
+        <p:nvPr/>
+      </p:nvGrpSpPr>
+      <p:grpSpPr>
+        <a:xfrm>
+          <a:off x="0" y="0"/>
+          <a:ext cx="0" cy="0"/>
+          <a:chOff x="0" y="0"/>
+          <a:chExt cx="0" cy="0"/>
+        </a:xfrm>
+      </p:grpSpPr>
+      <p:sp>
+        <p:nvSpPr>
+          <p:cNvPr id="2" name="Header Placeholder 1"/>
+          <p:cNvSpPr>
+            <a:spLocks noGrp="1"/>
+          </p:cNvSpPr>
+          <p:nvPr>
+            <p:ph type="hdr" sz="quarter"/>
+          </p:nvPr>
+        </p:nvSpPr>
+        <p:spPr>
+          <a:xfrm>
+            <a:off x="0" y="0"/>
+            <a:ext cx="2971800" cy="458788"/>
+          </a:xfrm>
+          <a:prstGeom prst="rect">
+            <a:avLst/>
+          </a:prstGeom>
+        </p:spPr>
+        <p:txBody>
+          <a:bodyPr vert="horz" lIns="91440" tIns="45720" rIns="91440" bIns="45720" rtlCol="0"/>
+          <a:lstStyle>
+            <a:lvl1pPr algn="l">
+              <a:defRPr sz="1200"/>
+            </a:lvl1pPr>
+          </a:lstStyle>
+          <a:p>
+            <a:endParaRPr lang="en-GB"/>
+          </a:p>
+        </p:txBody>
+      </p:sp>
+      <p:sp>
+        <p:nvSpPr>
+          <p:cNvPr id="3" name="Date Placeholder 2"/>
+          <p:cNvSpPr>
+            <a:spLocks noGrp="1"/>
+          </p:cNvSpPr>
+          <p:nvPr>
+            <p:ph type="dt" idx="1"/>
+          </p:nvPr>
+        </p:nvSpPr>
+        <p:spPr>
+          <a:xfrm>
+            <a:off x="3884613" y="0"/>
+            <a:ext cx="2971800" cy="458788"/>
+          </a:xfrm>
+          <a:prstGeom prst="rect">
+            <a:avLst/>
+          </a:prstGeom>
+        </p:spPr>
+        <p:txBody>
+          <a:bodyPr vert="horz" lIns="91440" tIns="45720" rIns="91440" bIns="45720" rtlCol="0"/>
+          <a:lstStyle>
+            <a:lvl1pPr algn="r">
+              <a:defRPr sz="1200"/>
+            </a:lvl1pPr>
+          </a:lstStyle>
+          <a:p>
+            <a:fld id="{1B659DF1-4439-4E9C-81CA-13AF2E1376AB}" type="datetimeFigureOut">
+              <a:rPr lang="en-GB" smtClean="0"/>
+              <a:t>10/03/2020</a:t>
+            </a:fld>
+            <a:endParaRPr lang="en-GB"/>
+          </a:p>
+        </p:txBody>
+      </p:sp>
+      <p:sp>
+        <p:nvSpPr>
+          <p:cNvPr id="4" name="Slide Image Placeholder 3"/>
+          <p:cNvSpPr>
+            <a:spLocks noGrp="1" noRot="1" noChangeAspect="1"/>
+          </p:cNvSpPr>
+          <p:nvPr>
+            <p:ph type="sldImg" idx="2"/>
+          </p:nvPr>
+        </p:nvSpPr>
+        <p:spPr>
+          <a:xfrm>
+            <a:off x="685800" y="1143000"/>
+            <a:ext cx="5486400" cy="3086100"/>
+          </a:xfrm>
+          <a:prstGeom prst="rect">
+            <a:avLst/>
+          </a:prstGeom>
+          <a:noFill/>
+          <a:ln w="12700">
+            <a:solidFill>
+              <a:prstClr val="black"/>
+            </a:solidFill>
+          </a:ln>
+        </p:spPr>
+        <p:txBody>
+          <a:bodyPr vert="horz" lIns="91440" tIns="45720" rIns="91440" bIns="45720" rtlCol="0" anchor="ctr"/>
+          <a:lstStyle/>
+          <a:p>
+            <a:endParaRPr lang="en-GB"/>
+          </a:p>
+        </p:txBody>
+      </p:sp>
+      <p:sp>
+        <p:nvSpPr>
+          <p:cNvPr id="5" name="Notes Placeholder 4"/>
+          <p:cNvSpPr>
+            <a:spLocks noGrp="1"/>
+          </p:cNvSpPr>
+          <p:nvPr>
+            <p:ph type="body" sz="quarter" idx="3"/>
+          </p:nvPr>
+        </p:nvSpPr>
+        <p:spPr>
+          <a:xfrm>
+            <a:off x="685800" y="4400550"/>
+            <a:ext cx="5486400" cy="3600450"/>
+          </a:xfrm>
+          <a:prstGeom prst="rect">
+            <a:avLst/>
+          </a:prstGeom>
+        </p:spPr>
+        <p:txBody>
+          <a:bodyPr vert="horz" lIns="91440" tIns="45720" rIns="91440" bIns="45720" rtlCol="0"/>
+          <a:lstStyle/>
+          <a:p>
+            <a:pPr lvl="0"/>
+            <a:r>
+              <a:rPr lang="en-US"/>
+              <a:t>Click to edit Master text styles</a:t>
+            </a:r>
+          </a:p>
+          <a:p>
+            <a:pPr lvl="1"/>
+            <a:r>
+              <a:rPr lang="en-US"/>
+              <a:t>Second level</a:t>
+            </a:r>
+          </a:p>
+          <a:p>
+            <a:pPr lvl="2"/>
+            <a:r>
+              <a:rPr lang="en-US"/>
+              <a:t>Third level</a:t>
+            </a:r>
+          </a:p>
+          <a:p>
+            <a:pPr lvl="3"/>
+            <a:r>
+              <a:rPr lang="en-US"/>
+              <a:t>Fourth level</a:t>
+            </a:r>
+          </a:p>
+          <a:p>
+            <a:pPr lvl="4"/>
+            <a:r>
+              <a:rPr lang="en-US"/>
+              <a:t>Fifth level</a:t>
+            </a:r>
+            <a:endParaRPr lang="en-GB"/>
+          </a:p>
+        </p:txBody>
+      </p:sp>
+      <p:sp>
+        <p:nvSpPr>
+          <p:cNvPr id="6" name="Footer Placeholder 5"/>
+          <p:cNvSpPr>
+            <a:spLocks noGrp="1"/>
+          </p:cNvSpPr>
+          <p:nvPr>
+            <p:ph type="ftr" sz="quarter" idx="4"/>
+          </p:nvPr>
+        </p:nvSpPr>
+        <p:spPr>
+          <a:xfrm>
+            <a:off x="0" y="8685213"/>
+            <a:ext cx="2971800" cy="458787"/>
+          </a:xfrm>
+          <a:prstGeom prst="rect">
+            <a:avLst/>
+          </a:prstGeom>
+        </p:spPr>
+        <p:txBody>
+          <a:bodyPr vert="horz" lIns="91440" tIns="45720" rIns="91440" bIns="45720" rtlCol="0" anchor="b"/>
+          <a:lstStyle>
+            <a:lvl1pPr algn="l">
+              <a:defRPr sz="1200"/>
+            </a:lvl1pPr>
+          </a:lstStyle>
+          <a:p>
+            <a:endParaRPr lang="en-GB"/>
+          </a:p>
+        </p:txBody>
+      </p:sp>
+      <p:sp>
+        <p:nvSpPr>
+          <p:cNvPr id="7" name="Slide Number Placeholder 6"/>
+          <p:cNvSpPr>
+            <a:spLocks noGrp="1"/>
+          </p:cNvSpPr>
+          <p:nvPr>
+            <p:ph type="sldNum" sz="quarter" idx="5"/>
+          </p:nvPr>
+        </p:nvSpPr>
+        <p:spPr>
+          <a:xfrm>
+            <a:off x="3884613" y="8685213"/>
+            <a:ext cx="2971800" cy="458787"/>
+          </a:xfrm>
+          <a:prstGeom prst="rect">
+            <a:avLst/>
+          </a:prstGeom>
+        </p:spPr>
+        <p:txBody>
+          <a:bodyPr vert="horz" lIns="91440" tIns="45720" rIns="91440" bIns="45720" rtlCol="0" anchor="b"/>
+          <a:lstStyle>
+            <a:lvl1pPr algn="r">
+              <a:defRPr sz="1200"/>
+            </a:lvl1pPr>
+          </a:lstStyle>
+          <a:p>
+            <a:fld id="{840DF87F-D6E1-4268-9C5F-41DF460BB5A5}" type="slidenum">
+              <a:rPr lang="en-GB" smtClean="0"/>
+              <a:t>‹#›</a:t>
+            </a:fld>
+            <a:endParaRPr lang="en-GB"/>
+          </a:p>
+        </p:txBody>
+      </p:sp>
+    </p:spTree>
+    <p:extLst>
+      <p:ext uri="{BB962C8B-B14F-4D97-AF65-F5344CB8AC3E}">
+        <p14:creationId xmlns:p14="http://schemas.microsoft.com/office/powerpoint/2010/main" val="2530719950"/>
+      </p:ext>
+    </p:extLst>
+  </p:cSld>
+  <p:clrMap bg1="lt1" tx1="dk1" bg2="lt2" tx2="dk2" accent1="accent1" accent2="accent2" accent3="accent3" accent4="accent4" accent5="accent5" accent6="accent6" hlink="hlink" folHlink="folHlink"/>
+  <p:notesStyle>
+    <a:lvl1pPr marL="0" algn="l" defTabSz="914400" rtl="0" eaLnBrk="1" latinLnBrk="0" hangingPunct="1">
+      <a:defRPr sz="1200" kern="1200">
+        <a:solidFill>
+          <a:schemeClr val="tx1"/>
+        </a:solidFill>
+        <a:latin typeface="+mn-lt"/>
+        <a:ea typeface="+mn-ea"/>
+        <a:cs typeface="+mn-cs"/>
+      </a:defRPr>
+    </a:lvl1pPr>
+    <a:lvl2pPr marL="457200" algn="l" defTabSz="914400" rtl="0" eaLnBrk="1" latinLnBrk="0" hangingPunct="1">
+      <a:defRPr sz="1200" kern="1200">
+        <a:solidFill>
+          <a:schemeClr val="tx1"/>
+        </a:solidFill>
+        <a:latin typeface="+mn-lt"/>
+        <a:ea typeface="+mn-ea"/>
+        <a:cs typeface="+mn-cs"/>
+      </a:defRPr>
+    </a:lvl2pPr>
+    <a:lvl3pPr marL="914400" algn="l" defTabSz="914400" rtl="0" eaLnBrk="1" latinLnBrk="0" hangingPunct="1">
+      <a:defRPr sz="1200" kern="1200">
+        <a:solidFill>
+          <a:schemeClr val="tx1"/>
+        </a:solidFill>
+        <a:latin typeface="+mn-lt"/>
+        <a:ea typeface="+mn-ea"/>
+        <a:cs typeface="+mn-cs"/>
+      </a:defRPr>
+    </a:lvl3pPr>
+    <a:lvl4pPr marL="1371600" algn="l" defTabSz="914400" rtl="0" eaLnBrk="1" latinLnBrk="0" hangingPunct="1">
+      <a:defRPr sz="1200" kern="1200">
+        <a:solidFill>
+          <a:schemeClr val="tx1"/>
+        </a:solidFill>
+        <a:latin typeface="+mn-lt"/>
+        <a:ea typeface="+mn-ea"/>
+        <a:cs typeface="+mn-cs"/>
+      </a:defRPr>
+    </a:lvl4pPr>
+    <a:lvl5pPr marL="1828800" algn="l" defTabSz="914400" rtl="0" eaLnBrk="1" latinLnBrk="0" hangingPunct="1">
+      <a:defRPr sz="1200" kern="1200">
+        <a:solidFill>
+          <a:schemeClr val="tx1"/>
+        </a:solidFill>
+        <a:latin typeface="+mn-lt"/>
+        <a:ea typeface="+mn-ea"/>
+        <a:cs typeface="+mn-cs"/>
+      </a:defRPr>
+    </a:lvl5pPr>
+    <a:lvl6pPr marL="2286000" algn="l" defTabSz="914400" rtl="0" eaLnBrk="1" latinLnBrk="0" hangingPunct="1">
+      <a:defRPr sz="1200" kern="1200">
+        <a:solidFill>
+          <a:schemeClr val="tx1"/>
+        </a:solidFill>
+        <a:latin typeface="+mn-lt"/>
+        <a:ea typeface="+mn-ea"/>
+        <a:cs typeface="+mn-cs"/>
+      </a:defRPr>
+    </a:lvl6pPr>
+    <a:lvl7pPr marL="2743200" algn="l" defTabSz="914400" rtl="0" eaLnBrk="1" latinLnBrk="0" hangingPunct="1">
+      <a:defRPr sz="1200" kern="1200">
+        <a:solidFill>
+          <a:schemeClr val="tx1"/>
+        </a:solidFill>
+        <a:latin typeface="+mn-lt"/>
+        <a:ea typeface="+mn-ea"/>
+        <a:cs typeface="+mn-cs"/>
+      </a:defRPr>
+    </a:lvl7pPr>
+    <a:lvl8pPr marL="3200400" algn="l" defTabSz="914400" rtl="0" eaLnBrk="1" latinLnBrk="0" hangingPunct="1">
+      <a:defRPr sz="1200" kern="1200">
+        <a:solidFill>
+          <a:schemeClr val="tx1"/>
+        </a:solidFill>
+        <a:latin typeface="+mn-lt"/>
+        <a:ea typeface="+mn-ea"/>
+        <a:cs typeface="+mn-cs"/>
+      </a:defRPr>
+    </a:lvl8pPr>
+    <a:lvl9pPr marL="3657600" algn="l" defTabSz="914400" rtl="0" eaLnBrk="1" latinLnBrk="0" hangingPunct="1">
+      <a:defRPr sz="1200" kern="1200">
+        <a:solidFill>
+          <a:schemeClr val="tx1"/>
+        </a:solidFill>
+        <a:latin typeface="+mn-lt"/>
+        <a:ea typeface="+mn-ea"/>
+        <a:cs typeface="+mn-cs"/>
+      </a:defRPr>
+    </a:lvl9pPr>
+  </p:notesStyle>
+</p:notesMaster>
+</file>
+
+<file path=ppt/notesSlides/notesSlide1.xml><?xml version="1.0" encoding="utf-8"?>
+<p:notes xmlns:a="http://schemas.openxmlformats.org/drawingml/2006/main" xmlns:r="http://schemas.openxmlformats.org/officeDocument/2006/relationships" xmlns:p="http://schemas.openxmlformats.org/presentationml/2006/main">
+  <p:cSld>
+    <p:spTree>
+      <p:nvGrpSpPr>
+        <p:cNvPr id="1" name=""/>
+        <p:cNvGrpSpPr/>
+        <p:nvPr/>
+      </p:nvGrpSpPr>
+      <p:grpSpPr>
+        <a:xfrm>
+          <a:off x="0" y="0"/>
+          <a:ext cx="0" cy="0"/>
+          <a:chOff x="0" y="0"/>
+          <a:chExt cx="0" cy="0"/>
+        </a:xfrm>
+      </p:grpSpPr>
+      <p:sp>
+        <p:nvSpPr>
+          <p:cNvPr id="2" name="Slide Image Placeholder 1"/>
+          <p:cNvSpPr>
+            <a:spLocks noGrp="1" noRot="1" noChangeAspect="1"/>
+          </p:cNvSpPr>
+          <p:nvPr>
+            <p:ph type="sldImg"/>
+          </p:nvPr>
+        </p:nvSpPr>
+        <p:spPr/>
+      </p:sp>
+      <p:sp>
+        <p:nvSpPr>
+          <p:cNvPr id="3" name="Notes Placeholder 2"/>
+          <p:cNvSpPr>
+            <a:spLocks noGrp="1"/>
+          </p:cNvSpPr>
+          <p:nvPr>
+            <p:ph type="body" idx="1"/>
+          </p:nvPr>
+        </p:nvSpPr>
+        <p:spPr/>
+        <p:txBody>
+          <a:bodyPr/>
+          <a:lstStyle/>
+          <a:p>
+            <a:r>
+              <a:rPr lang="en-GB" dirty="0"/>
+              <a:t>Our topic is on Plastic Pollution</a:t>
+            </a:r>
+          </a:p>
+          <a:p>
+            <a:endParaRPr lang="en-GB" dirty="0"/>
+          </a:p>
+        </p:txBody>
+      </p:sp>
+      <p:sp>
+        <p:nvSpPr>
+          <p:cNvPr id="4" name="Slide Number Placeholder 3"/>
+          <p:cNvSpPr>
+            <a:spLocks noGrp="1"/>
+          </p:cNvSpPr>
+          <p:nvPr>
+            <p:ph type="sldNum" sz="quarter" idx="5"/>
+          </p:nvPr>
+        </p:nvSpPr>
+        <p:spPr/>
+        <p:txBody>
+          <a:bodyPr/>
+          <a:lstStyle/>
+          <a:p>
+            <a:fld id="{840DF87F-D6E1-4268-9C5F-41DF460BB5A5}" type="slidenum">
+              <a:rPr lang="en-GB" smtClean="0"/>
+              <a:t>1</a:t>
+            </a:fld>
+            <a:endParaRPr lang="en-GB"/>
+          </a:p>
+        </p:txBody>
+      </p:sp>
+    </p:spTree>
+    <p:extLst>
+      <p:ext uri="{BB962C8B-B14F-4D97-AF65-F5344CB8AC3E}">
+        <p14:creationId xmlns:p14="http://schemas.microsoft.com/office/powerpoint/2010/main" val="676106312"/>
+      </p:ext>
+    </p:extLst>
+  </p:cSld>
+  <p:clrMapOvr>
+    <a:masterClrMapping/>
+  </p:clrMapOvr>
+</p:notes>
+</file>
+
+<file path=ppt/notesSlides/notesSlide2.xml><?xml version="1.0" encoding="utf-8"?>
+<p:notes xmlns:a="http://schemas.openxmlformats.org/drawingml/2006/main" xmlns:r="http://schemas.openxmlformats.org/officeDocument/2006/relationships" xmlns:p="http://schemas.openxmlformats.org/presentationml/2006/main">
+  <p:cSld>
+    <p:spTree>
+      <p:nvGrpSpPr>
+        <p:cNvPr id="1" name=""/>
+        <p:cNvGrpSpPr/>
+        <p:nvPr/>
+      </p:nvGrpSpPr>
+      <p:grpSpPr>
+        <a:xfrm>
+          <a:off x="0" y="0"/>
+          <a:ext cx="0" cy="0"/>
+          <a:chOff x="0" y="0"/>
+          <a:chExt cx="0" cy="0"/>
+        </a:xfrm>
+      </p:grpSpPr>
+      <p:sp>
+        <p:nvSpPr>
+          <p:cNvPr id="2" name="Slide Image Placeholder 1"/>
+          <p:cNvSpPr>
+            <a:spLocks noGrp="1" noRot="1" noChangeAspect="1"/>
+          </p:cNvSpPr>
+          <p:nvPr>
+            <p:ph type="sldImg"/>
+          </p:nvPr>
+        </p:nvSpPr>
+        <p:spPr/>
+      </p:sp>
+      <p:sp>
+        <p:nvSpPr>
+          <p:cNvPr id="3" name="Notes Placeholder 2"/>
+          <p:cNvSpPr>
+            <a:spLocks noGrp="1"/>
+          </p:cNvSpPr>
+          <p:nvPr>
+            <p:ph type="body" idx="1"/>
+          </p:nvPr>
+        </p:nvSpPr>
+        <p:spPr/>
+        <p:txBody>
+          <a:bodyPr/>
+          <a:lstStyle/>
+          <a:p>
+            <a:endParaRPr lang="en-GB"/>
+          </a:p>
+        </p:txBody>
+      </p:sp>
+      <p:sp>
+        <p:nvSpPr>
+          <p:cNvPr id="4" name="Slide Number Placeholder 3"/>
+          <p:cNvSpPr>
+            <a:spLocks noGrp="1"/>
+          </p:cNvSpPr>
+          <p:nvPr>
+            <p:ph type="sldNum" sz="quarter" idx="5"/>
+          </p:nvPr>
+        </p:nvSpPr>
+        <p:spPr/>
+        <p:txBody>
+          <a:bodyPr/>
+          <a:lstStyle/>
+          <a:p>
+            <a:fld id="{840DF87F-D6E1-4268-9C5F-41DF460BB5A5}" type="slidenum">
+              <a:rPr lang="en-GB" smtClean="0"/>
+              <a:t>2</a:t>
+            </a:fld>
+            <a:endParaRPr lang="en-GB"/>
+          </a:p>
+        </p:txBody>
+      </p:sp>
+    </p:spTree>
+    <p:extLst>
+      <p:ext uri="{BB962C8B-B14F-4D97-AF65-F5344CB8AC3E}">
+        <p14:creationId xmlns:p14="http://schemas.microsoft.com/office/powerpoint/2010/main" val="2727560089"/>
+      </p:ext>
+    </p:extLst>
+  </p:cSld>
+  <p:clrMapOvr>
+    <a:masterClrMapping/>
+  </p:clrMapOvr>
+</p:notes>
+</file>
+
+<file path=ppt/notesSlides/notesSlide3.xml><?xml version="1.0" encoding="utf-8"?>
+<p:notes xmlns:a="http://schemas.openxmlformats.org/drawingml/2006/main" xmlns:r="http://schemas.openxmlformats.org/officeDocument/2006/relationships" xmlns:p="http://schemas.openxmlformats.org/presentationml/2006/main">
+  <p:cSld>
+    <p:spTree>
+      <p:nvGrpSpPr>
+        <p:cNvPr id="1" name=""/>
+        <p:cNvGrpSpPr/>
+        <p:nvPr/>
+      </p:nvGrpSpPr>
+      <p:grpSpPr>
+        <a:xfrm>
+          <a:off x="0" y="0"/>
+          <a:ext cx="0" cy="0"/>
+          <a:chOff x="0" y="0"/>
+          <a:chExt cx="0" cy="0"/>
+        </a:xfrm>
+      </p:grpSpPr>
+      <p:sp>
+        <p:nvSpPr>
+          <p:cNvPr id="2" name="Slide Image Placeholder 1"/>
+          <p:cNvSpPr>
+            <a:spLocks noGrp="1" noRot="1" noChangeAspect="1"/>
+          </p:cNvSpPr>
+          <p:nvPr>
+            <p:ph type="sldImg"/>
+          </p:nvPr>
+        </p:nvSpPr>
+        <p:spPr/>
+      </p:sp>
+      <p:sp>
+        <p:nvSpPr>
+          <p:cNvPr id="3" name="Notes Placeholder 2"/>
+          <p:cNvSpPr>
+            <a:spLocks noGrp="1"/>
+          </p:cNvSpPr>
+          <p:nvPr>
+            <p:ph type="body" idx="1"/>
+          </p:nvPr>
+        </p:nvSpPr>
+        <p:spPr/>
+        <p:txBody>
+          <a:bodyPr/>
+          <a:lstStyle/>
+          <a:p>
+            <a:endParaRPr lang="en-GB"/>
+          </a:p>
+        </p:txBody>
+      </p:sp>
+      <p:sp>
+        <p:nvSpPr>
+          <p:cNvPr id="4" name="Slide Number Placeholder 3"/>
+          <p:cNvSpPr>
+            <a:spLocks noGrp="1"/>
+          </p:cNvSpPr>
+          <p:nvPr>
+            <p:ph type="sldNum" sz="quarter" idx="5"/>
+          </p:nvPr>
+        </p:nvSpPr>
+        <p:spPr/>
+        <p:txBody>
+          <a:bodyPr/>
+          <a:lstStyle/>
+          <a:p>
+            <a:fld id="{840DF87F-D6E1-4268-9C5F-41DF460BB5A5}" type="slidenum">
+              <a:rPr lang="en-GB" smtClean="0"/>
+              <a:t>3</a:t>
+            </a:fld>
+            <a:endParaRPr lang="en-GB"/>
+          </a:p>
+        </p:txBody>
+      </p:sp>
+    </p:spTree>
+    <p:extLst>
+      <p:ext uri="{BB962C8B-B14F-4D97-AF65-F5344CB8AC3E}">
+        <p14:creationId xmlns:p14="http://schemas.microsoft.com/office/powerpoint/2010/main" val="2690948307"/>
+      </p:ext>
+    </p:extLst>
+  </p:cSld>
+  <p:clrMapOvr>
+    <a:masterClrMapping/>
+  </p:clrMapOvr>
+</p:notes>
+</file>
+
+<file path=ppt/notesSlides/notesSlide4.xml><?xml version="1.0" encoding="utf-8"?>
+<p:notes xmlns:a="http://schemas.openxmlformats.org/drawingml/2006/main" xmlns:r="http://schemas.openxmlformats.org/officeDocument/2006/relationships" xmlns:p="http://schemas.openxmlformats.org/presentationml/2006/main">
+  <p:cSld>
+    <p:spTree>
+      <p:nvGrpSpPr>
+        <p:cNvPr id="1" name=""/>
+        <p:cNvGrpSpPr/>
+        <p:nvPr/>
+      </p:nvGrpSpPr>
+      <p:grpSpPr>
+        <a:xfrm>
+          <a:off x="0" y="0"/>
+          <a:ext cx="0" cy="0"/>
+          <a:chOff x="0" y="0"/>
+          <a:chExt cx="0" cy="0"/>
+        </a:xfrm>
+      </p:grpSpPr>
+      <p:sp>
+        <p:nvSpPr>
+          <p:cNvPr id="2" name="Slide Image Placeholder 1"/>
+          <p:cNvSpPr>
+            <a:spLocks noGrp="1" noRot="1" noChangeAspect="1"/>
+          </p:cNvSpPr>
+          <p:nvPr>
+            <p:ph type="sldImg"/>
+          </p:nvPr>
+        </p:nvSpPr>
+        <p:spPr/>
+      </p:sp>
+      <p:sp>
+        <p:nvSpPr>
+          <p:cNvPr id="3" name="Notes Placeholder 2"/>
+          <p:cNvSpPr>
+            <a:spLocks noGrp="1"/>
+          </p:cNvSpPr>
+          <p:nvPr>
+            <p:ph type="body" idx="1"/>
+          </p:nvPr>
+        </p:nvSpPr>
+        <p:spPr/>
+        <p:txBody>
+          <a:bodyPr/>
+          <a:lstStyle/>
+          <a:p>
+            <a:endParaRPr lang="en-GB"/>
+          </a:p>
+        </p:txBody>
+      </p:sp>
+      <p:sp>
+        <p:nvSpPr>
+          <p:cNvPr id="4" name="Slide Number Placeholder 3"/>
+          <p:cNvSpPr>
+            <a:spLocks noGrp="1"/>
+          </p:cNvSpPr>
+          <p:nvPr>
+            <p:ph type="sldNum" sz="quarter" idx="5"/>
+          </p:nvPr>
+        </p:nvSpPr>
+        <p:spPr/>
+        <p:txBody>
+          <a:bodyPr/>
+          <a:lstStyle/>
+          <a:p>
+            <a:fld id="{840DF87F-D6E1-4268-9C5F-41DF460BB5A5}" type="slidenum">
+              <a:rPr lang="en-GB" smtClean="0"/>
+              <a:t>4</a:t>
+            </a:fld>
+            <a:endParaRPr lang="en-GB"/>
+          </a:p>
+        </p:txBody>
+      </p:sp>
+    </p:spTree>
+    <p:extLst>
+      <p:ext uri="{BB962C8B-B14F-4D97-AF65-F5344CB8AC3E}">
+        <p14:creationId xmlns:p14="http://schemas.microsoft.com/office/powerpoint/2010/main" val="585690878"/>
+      </p:ext>
+    </p:extLst>
+  </p:cSld>
+  <p:clrMapOvr>
+    <a:masterClrMapping/>
+  </p:clrMapOvr>
+</p:notes>
+</file>
+
+<file path=ppt/notesSlides/notesSlide5.xml><?xml version="1.0" encoding="utf-8"?>
+<p:notes xmlns:a="http://schemas.openxmlformats.org/drawingml/2006/main" xmlns:r="http://schemas.openxmlformats.org/officeDocument/2006/relationships" xmlns:p="http://schemas.openxmlformats.org/presentationml/2006/main">
+  <p:cSld>
+    <p:spTree>
+      <p:nvGrpSpPr>
+        <p:cNvPr id="1" name=""/>
+        <p:cNvGrpSpPr/>
+        <p:nvPr/>
+      </p:nvGrpSpPr>
+      <p:grpSpPr>
+        <a:xfrm>
+          <a:off x="0" y="0"/>
+          <a:ext cx="0" cy="0"/>
+          <a:chOff x="0" y="0"/>
+          <a:chExt cx="0" cy="0"/>
+        </a:xfrm>
+      </p:grpSpPr>
+      <p:sp>
+        <p:nvSpPr>
+          <p:cNvPr id="2" name="Slide Image Placeholder 1"/>
+          <p:cNvSpPr>
+            <a:spLocks noGrp="1" noRot="1" noChangeAspect="1"/>
+          </p:cNvSpPr>
+          <p:nvPr>
+            <p:ph type="sldImg"/>
+          </p:nvPr>
+        </p:nvSpPr>
+        <p:spPr/>
+      </p:sp>
+      <p:sp>
+        <p:nvSpPr>
+          <p:cNvPr id="3" name="Notes Placeholder 2"/>
+          <p:cNvSpPr>
+            <a:spLocks noGrp="1"/>
+          </p:cNvSpPr>
+          <p:nvPr>
+            <p:ph type="body" idx="1"/>
+          </p:nvPr>
+        </p:nvSpPr>
+        <p:spPr/>
+        <p:txBody>
+          <a:bodyPr/>
+          <a:lstStyle/>
+          <a:p>
+            <a:endParaRPr lang="en-GB"/>
+          </a:p>
+        </p:txBody>
+      </p:sp>
+      <p:sp>
+        <p:nvSpPr>
+          <p:cNvPr id="4" name="Slide Number Placeholder 3"/>
+          <p:cNvSpPr>
+            <a:spLocks noGrp="1"/>
+          </p:cNvSpPr>
+          <p:nvPr>
+            <p:ph type="sldNum" sz="quarter" idx="5"/>
+          </p:nvPr>
+        </p:nvSpPr>
+        <p:spPr/>
+        <p:txBody>
+          <a:bodyPr/>
+          <a:lstStyle/>
+          <a:p>
+            <a:fld id="{840DF87F-D6E1-4268-9C5F-41DF460BB5A5}" type="slidenum">
+              <a:rPr lang="en-GB" smtClean="0"/>
+              <a:t>5</a:t>
+            </a:fld>
+            <a:endParaRPr lang="en-GB"/>
+          </a:p>
+        </p:txBody>
+      </p:sp>
+    </p:spTree>
+    <p:extLst>
+      <p:ext uri="{BB962C8B-B14F-4D97-AF65-F5344CB8AC3E}">
+        <p14:creationId xmlns:p14="http://schemas.microsoft.com/office/powerpoint/2010/main" val="995713163"/>
+      </p:ext>
+    </p:extLst>
+  </p:cSld>
+  <p:clrMapOvr>
+    <a:masterClrMapping/>
+  </p:clrMapOvr>
+</p:notes>
 </file>
 
 <file path=ppt/slideLayouts/slideLayout1.xml><?xml version="1.0" encoding="utf-8"?>
@@ -458,7 +1309,7 @@
           <a:p>
             <a:fld id="{51CB4ED3-25AD-4501-A3D0-B7CF1556DFF4}" type="datetimeFigureOut">
               <a:rPr lang="en-GB" smtClean="0"/>
-              <a:t>04/03/2020</a:t>
+              <a:t>10/03/2020</a:t>
             </a:fld>
             <a:endParaRPr lang="en-GB"/>
           </a:p>
@@ -658,7 +1509,7 @@
           <a:p>
             <a:fld id="{51CB4ED3-25AD-4501-A3D0-B7CF1556DFF4}" type="datetimeFigureOut">
               <a:rPr lang="en-GB" smtClean="0"/>
-              <a:t>04/03/2020</a:t>
+              <a:t>10/03/2020</a:t>
             </a:fld>
             <a:endParaRPr lang="en-GB"/>
           </a:p>
@@ -868,7 +1719,7 @@
           <a:p>
             <a:fld id="{51CB4ED3-25AD-4501-A3D0-B7CF1556DFF4}" type="datetimeFigureOut">
               <a:rPr lang="en-GB" smtClean="0"/>
-              <a:t>04/03/2020</a:t>
+              <a:t>10/03/2020</a:t>
             </a:fld>
             <a:endParaRPr lang="en-GB"/>
           </a:p>
@@ -932,6 +1783,166 @@
     <p:extLst>
       <p:ext uri="{BB962C8B-B14F-4D97-AF65-F5344CB8AC3E}">
         <p14:creationId xmlns:p14="http://schemas.microsoft.com/office/powerpoint/2010/main" val="270514734"/>
+      </p:ext>
+    </p:extLst>
+  </p:cSld>
+  <p:clrMapOvr>
+    <a:masterClrMapping/>
+  </p:clrMapOvr>
+</p:sldLayout>
+</file>
+
+<file path=ppt/slideLayouts/slideLayout12.xml><?xml version="1.0" encoding="utf-8"?>
+<p:sldLayout xmlns:a="http://schemas.openxmlformats.org/drawingml/2006/main" xmlns:r="http://schemas.openxmlformats.org/officeDocument/2006/relationships" xmlns:p="http://schemas.openxmlformats.org/presentationml/2006/main" preserve="1" userDrawn="1">
+  <p:cSld name="Custom Layout">
+    <p:spTree>
+      <p:nvGrpSpPr>
+        <p:cNvPr id="1" name=""/>
+        <p:cNvGrpSpPr/>
+        <p:nvPr/>
+      </p:nvGrpSpPr>
+      <p:grpSpPr>
+        <a:xfrm>
+          <a:off x="0" y="0"/>
+          <a:ext cx="0" cy="0"/>
+          <a:chOff x="0" y="0"/>
+          <a:chExt cx="0" cy="0"/>
+        </a:xfrm>
+      </p:grpSpPr>
+      <p:sp>
+        <p:nvSpPr>
+          <p:cNvPr id="2" name="Title 1">
+            <a:extLst>
+              <a:ext uri="{FF2B5EF4-FFF2-40B4-BE49-F238E27FC236}">
+                <a16:creationId xmlns:a16="http://schemas.microsoft.com/office/drawing/2014/main" id="{9E7C72A3-B0D9-455C-BFF1-242AF861854A}"/>
+              </a:ext>
+            </a:extLst>
+          </p:cNvPr>
+          <p:cNvSpPr>
+            <a:spLocks noGrp="1"/>
+          </p:cNvSpPr>
+          <p:nvPr>
+            <p:ph type="title"/>
+          </p:nvPr>
+        </p:nvSpPr>
+        <p:spPr>
+          <a:xfrm>
+            <a:off x="0" y="0"/>
+            <a:ext cx="12192000" cy="777766"/>
+          </a:xfrm>
+          <a:solidFill>
+            <a:schemeClr val="accent5">
+              <a:lumMod val="50000"/>
+            </a:schemeClr>
+          </a:solidFill>
+        </p:spPr>
+        <p:txBody>
+          <a:bodyPr lIns="180000"/>
+          <a:lstStyle>
+            <a:lvl1pPr>
+              <a:defRPr b="1">
+                <a:solidFill>
+                  <a:schemeClr val="bg1"/>
+                </a:solidFill>
+              </a:defRPr>
+            </a:lvl1pPr>
+          </a:lstStyle>
+          <a:p>
+            <a:r>
+              <a:rPr lang="en-US" dirty="0"/>
+              <a:t>Click to edit Master title style</a:t>
+            </a:r>
+            <a:endParaRPr lang="en-GB" dirty="0"/>
+          </a:p>
+        </p:txBody>
+      </p:sp>
+      <p:sp>
+        <p:nvSpPr>
+          <p:cNvPr id="3" name="Date Placeholder 2">
+            <a:extLst>
+              <a:ext uri="{FF2B5EF4-FFF2-40B4-BE49-F238E27FC236}">
+                <a16:creationId xmlns:a16="http://schemas.microsoft.com/office/drawing/2014/main" id="{87E7E21F-4336-41A1-B95E-64DA70D467B2}"/>
+              </a:ext>
+            </a:extLst>
+          </p:cNvPr>
+          <p:cNvSpPr>
+            <a:spLocks noGrp="1"/>
+          </p:cNvSpPr>
+          <p:nvPr>
+            <p:ph type="dt" sz="half" idx="10"/>
+          </p:nvPr>
+        </p:nvSpPr>
+        <p:spPr/>
+        <p:txBody>
+          <a:bodyPr/>
+          <a:lstStyle/>
+          <a:p>
+            <a:fld id="{51CB4ED3-25AD-4501-A3D0-B7CF1556DFF4}" type="datetimeFigureOut">
+              <a:rPr lang="en-GB" smtClean="0"/>
+              <a:t>10/03/2020</a:t>
+            </a:fld>
+            <a:endParaRPr lang="en-GB"/>
+          </a:p>
+        </p:txBody>
+      </p:sp>
+      <p:sp>
+        <p:nvSpPr>
+          <p:cNvPr id="4" name="Footer Placeholder 3">
+            <a:extLst>
+              <a:ext uri="{FF2B5EF4-FFF2-40B4-BE49-F238E27FC236}">
+                <a16:creationId xmlns:a16="http://schemas.microsoft.com/office/drawing/2014/main" id="{D5B79A04-0F45-4FCD-BBE6-D4A5F6D947C7}"/>
+              </a:ext>
+            </a:extLst>
+          </p:cNvPr>
+          <p:cNvSpPr>
+            <a:spLocks noGrp="1"/>
+          </p:cNvSpPr>
+          <p:nvPr>
+            <p:ph type="ftr" sz="quarter" idx="11"/>
+          </p:nvPr>
+        </p:nvSpPr>
+        <p:spPr/>
+        <p:txBody>
+          <a:bodyPr/>
+          <a:lstStyle/>
+          <a:p>
+            <a:endParaRPr lang="en-GB"/>
+          </a:p>
+        </p:txBody>
+      </p:sp>
+      <p:sp>
+        <p:nvSpPr>
+          <p:cNvPr id="5" name="Slide Number Placeholder 4">
+            <a:extLst>
+              <a:ext uri="{FF2B5EF4-FFF2-40B4-BE49-F238E27FC236}">
+                <a16:creationId xmlns:a16="http://schemas.microsoft.com/office/drawing/2014/main" id="{73EADF9F-7632-4014-B381-051B070929E2}"/>
+              </a:ext>
+            </a:extLst>
+          </p:cNvPr>
+          <p:cNvSpPr>
+            <a:spLocks noGrp="1"/>
+          </p:cNvSpPr>
+          <p:nvPr>
+            <p:ph type="sldNum" sz="quarter" idx="12"/>
+          </p:nvPr>
+        </p:nvSpPr>
+        <p:spPr/>
+        <p:txBody>
+          <a:bodyPr/>
+          <a:lstStyle/>
+          <a:p>
+            <a:fld id="{C2F2D33F-525F-418B-85BF-08246B340BA4}" type="slidenum">
+              <a:rPr lang="en-GB" smtClean="0"/>
+              <a:t>‹#›</a:t>
+            </a:fld>
+            <a:endParaRPr lang="en-GB"/>
+          </a:p>
+        </p:txBody>
+      </p:sp>
+    </p:spTree>
+    <p:extLst>
+      <p:ext uri="{BB962C8B-B14F-4D97-AF65-F5344CB8AC3E}">
+        <p14:creationId xmlns:p14="http://schemas.microsoft.com/office/powerpoint/2010/main" val="4264740658"/>
       </p:ext>
     </p:extLst>
   </p:cSld>
@@ -1068,7 +2079,7 @@
           <a:p>
             <a:fld id="{51CB4ED3-25AD-4501-A3D0-B7CF1556DFF4}" type="datetimeFigureOut">
               <a:rPr lang="en-GB" smtClean="0"/>
-              <a:t>04/03/2020</a:t>
+              <a:t>10/03/2020</a:t>
             </a:fld>
             <a:endParaRPr lang="en-GB"/>
           </a:p>
@@ -1344,7 +2355,7 @@
           <a:p>
             <a:fld id="{51CB4ED3-25AD-4501-A3D0-B7CF1556DFF4}" type="datetimeFigureOut">
               <a:rPr lang="en-GB" smtClean="0"/>
-              <a:t>04/03/2020</a:t>
+              <a:t>10/03/2020</a:t>
             </a:fld>
             <a:endParaRPr lang="en-GB"/>
           </a:p>
@@ -1612,7 +2623,7 @@
           <a:p>
             <a:fld id="{51CB4ED3-25AD-4501-A3D0-B7CF1556DFF4}" type="datetimeFigureOut">
               <a:rPr lang="en-GB" smtClean="0"/>
-              <a:t>04/03/2020</a:t>
+              <a:t>10/03/2020</a:t>
             </a:fld>
             <a:endParaRPr lang="en-GB"/>
           </a:p>
@@ -2027,7 +3038,7 @@
           <a:p>
             <a:fld id="{51CB4ED3-25AD-4501-A3D0-B7CF1556DFF4}" type="datetimeFigureOut">
               <a:rPr lang="en-GB" smtClean="0"/>
-              <a:t>04/03/2020</a:t>
+              <a:t>10/03/2020</a:t>
             </a:fld>
             <a:endParaRPr lang="en-GB"/>
           </a:p>
@@ -2169,7 +3180,7 @@
           <a:p>
             <a:fld id="{51CB4ED3-25AD-4501-A3D0-B7CF1556DFF4}" type="datetimeFigureOut">
               <a:rPr lang="en-GB" smtClean="0"/>
-              <a:t>04/03/2020</a:t>
+              <a:t>10/03/2020</a:t>
             </a:fld>
             <a:endParaRPr lang="en-GB"/>
           </a:p>
@@ -2282,7 +3293,7 @@
           <a:p>
             <a:fld id="{51CB4ED3-25AD-4501-A3D0-B7CF1556DFF4}" type="datetimeFigureOut">
               <a:rPr lang="en-GB" smtClean="0"/>
-              <a:t>04/03/2020</a:t>
+              <a:t>10/03/2020</a:t>
             </a:fld>
             <a:endParaRPr lang="en-GB"/>
           </a:p>
@@ -2595,7 +3606,7 @@
           <a:p>
             <a:fld id="{51CB4ED3-25AD-4501-A3D0-B7CF1556DFF4}" type="datetimeFigureOut">
               <a:rPr lang="en-GB" smtClean="0"/>
-              <a:t>04/03/2020</a:t>
+              <a:t>10/03/2020</a:t>
             </a:fld>
             <a:endParaRPr lang="en-GB"/>
           </a:p>
@@ -2884,7 +3895,7 @@
           <a:p>
             <a:fld id="{51CB4ED3-25AD-4501-A3D0-B7CF1556DFF4}" type="datetimeFigureOut">
               <a:rPr lang="en-GB" smtClean="0"/>
-              <a:t>04/03/2020</a:t>
+              <a:t>10/03/2020</a:t>
             </a:fld>
             <a:endParaRPr lang="en-GB"/>
           </a:p>
@@ -3127,7 +4138,7 @@
           <a:p>
             <a:fld id="{51CB4ED3-25AD-4501-A3D0-B7CF1556DFF4}" type="datetimeFigureOut">
               <a:rPr lang="en-GB" smtClean="0"/>
-              <a:t>04/03/2020</a:t>
+              <a:t>10/03/2020</a:t>
             </a:fld>
             <a:endParaRPr lang="en-GB"/>
           </a:p>
@@ -3243,6 +4254,7 @@
     <p:sldLayoutId id="2147483657" r:id="rId9"/>
     <p:sldLayoutId id="2147483658" r:id="rId10"/>
     <p:sldLayoutId id="2147483659" r:id="rId11"/>
+    <p:sldLayoutId id="2147483660" r:id="rId12"/>
   </p:sldLayoutIdLst>
   <p:txStyles>
     <p:titleStyle>
@@ -3585,10 +4597,15 @@
             <a:spLocks noGrp="1"/>
           </p:cNvSpPr>
           <p:nvPr>
-            <p:ph idx="1"/>
-          </p:nvPr>
-        </p:nvSpPr>
-        <p:spPr/>
+            <p:ph idx="4294967295"/>
+          </p:nvPr>
+        </p:nvSpPr>
+        <p:spPr>
+          <a:xfrm>
+            <a:off x="0" y="1825625"/>
+            <a:ext cx="10515600" cy="4351338"/>
+          </a:xfrm>
+        </p:spPr>
         <p:txBody>
           <a:bodyPr>
             <a:normAutofit lnSpcReduction="10000"/>
@@ -3597,7 +4614,7 @@
           <a:p>
             <a:r>
               <a:rPr lang="en-GB" dirty="0"/>
-              <a:t>Our topic is marine plastic pollution</a:t>
+              <a:t>Topic: marine plastic pollution</a:t>
             </a:r>
           </a:p>
           <a:p>
@@ -3734,10 +4751,15 @@
             <a:spLocks noGrp="1"/>
           </p:cNvSpPr>
           <p:nvPr>
-            <p:ph idx="1"/>
-          </p:nvPr>
-        </p:nvSpPr>
-        <p:spPr/>
+            <p:ph idx="4294967295"/>
+          </p:nvPr>
+        </p:nvSpPr>
+        <p:spPr>
+          <a:xfrm>
+            <a:off x="0" y="1825625"/>
+            <a:ext cx="10515600" cy="4351338"/>
+          </a:xfrm>
+        </p:spPr>
         <p:txBody>
           <a:bodyPr>
             <a:normAutofit fontScale="92500" lnSpcReduction="20000"/>
@@ -3806,7 +4828,7 @@
           <a:p>
             <a:r>
               <a:rPr lang="en-GB" dirty="0"/>
-              <a:t>We had a lot of references, but no hypothesis…</a:t>
+              <a:t>We had many references, but no hypothesis…</a:t>
             </a:r>
           </a:p>
         </p:txBody>
@@ -3882,10 +4904,15 @@
             <a:spLocks noGrp="1"/>
           </p:cNvSpPr>
           <p:nvPr>
-            <p:ph idx="1"/>
-          </p:nvPr>
-        </p:nvSpPr>
-        <p:spPr/>
+            <p:ph idx="4294967295"/>
+          </p:nvPr>
+        </p:nvSpPr>
+        <p:spPr>
+          <a:xfrm>
+            <a:off x="0" y="935038"/>
+            <a:ext cx="6267450" cy="5241925"/>
+          </a:xfrm>
+        </p:spPr>
         <p:txBody>
           <a:bodyPr/>
           <a:lstStyle/>
@@ -3910,6 +4937,89 @@
           </a:p>
         </p:txBody>
       </p:sp>
+      <p:pic>
+        <p:nvPicPr>
+          <p:cNvPr id="5" name="Picture 4" descr="A screenshot of a cell phone&#10;&#10;Description automatically generated">
+            <a:extLst>
+              <a:ext uri="{FF2B5EF4-FFF2-40B4-BE49-F238E27FC236}">
+                <a16:creationId xmlns:a16="http://schemas.microsoft.com/office/drawing/2014/main" id="{D9608F30-4868-4CD1-9506-4C1B6D1BB464}"/>
+              </a:ext>
+            </a:extLst>
+          </p:cNvPr>
+          <p:cNvPicPr>
+            <a:picLocks noChangeAspect="1"/>
+          </p:cNvPicPr>
+          <p:nvPr/>
+        </p:nvPicPr>
+        <p:blipFill>
+          <a:blip r:embed="rId3">
+            <a:extLst>
+              <a:ext uri="{28A0092B-C50C-407E-A947-70E740481C1C}">
+                <a14:useLocalDpi xmlns:a14="http://schemas.microsoft.com/office/drawing/2010/main" val="0"/>
+              </a:ext>
+            </a:extLst>
+          </a:blip>
+          <a:stretch>
+            <a:fillRect/>
+          </a:stretch>
+        </p:blipFill>
+        <p:spPr>
+          <a:xfrm>
+            <a:off x="7357243" y="1372668"/>
+            <a:ext cx="4367047" cy="4367047"/>
+          </a:xfrm>
+          <a:prstGeom prst="rect">
+            <a:avLst/>
+          </a:prstGeom>
+        </p:spPr>
+      </p:pic>
+      <p:pic>
+        <p:nvPicPr>
+          <p:cNvPr id="8" name="Picture 2">
+            <a:extLst>
+              <a:ext uri="{FF2B5EF4-FFF2-40B4-BE49-F238E27FC236}">
+                <a16:creationId xmlns:a16="http://schemas.microsoft.com/office/drawing/2014/main" id="{73434485-2054-4C2A-8549-A2A2A77A6FD3}"/>
+              </a:ext>
+            </a:extLst>
+          </p:cNvPr>
+          <p:cNvPicPr>
+            <a:picLocks noChangeAspect="1" noChangeArrowheads="1"/>
+          </p:cNvPicPr>
+          <p:nvPr/>
+        </p:nvPicPr>
+        <p:blipFill>
+          <a:blip r:embed="rId4">
+            <a:extLst>
+              <a:ext uri="{28A0092B-C50C-407E-A947-70E740481C1C}">
+                <a14:useLocalDpi xmlns:a14="http://schemas.microsoft.com/office/drawing/2010/main" val="0"/>
+              </a:ext>
+            </a:extLst>
+          </a:blip>
+          <a:srcRect/>
+          <a:stretch>
+            <a:fillRect/>
+          </a:stretch>
+        </p:blipFill>
+        <p:spPr bwMode="auto">
+          <a:xfrm>
+            <a:off x="2030135" y="3328235"/>
+            <a:ext cx="4622911" cy="3302079"/>
+          </a:xfrm>
+          <a:prstGeom prst="rect">
+            <a:avLst/>
+          </a:prstGeom>
+          <a:noFill/>
+          <a:extLst>
+            <a:ext uri="{909E8E84-426E-40DD-AFC4-6F175D3DCCD1}">
+              <a14:hiddenFill xmlns:a14="http://schemas.microsoft.com/office/drawing/2010/main">
+                <a:solidFill>
+                  <a:srgbClr val="FFFFFF"/>
+                </a:solidFill>
+              </a14:hiddenFill>
+            </a:ext>
+          </a:extLst>
+        </p:spPr>
+      </p:pic>
     </p:spTree>
     <p:extLst>
       <p:ext uri="{BB962C8B-B14F-4D97-AF65-F5344CB8AC3E}">
@@ -3963,7 +5073,7 @@
           <a:p>
             <a:r>
               <a:rPr lang="en-GB" dirty="0"/>
-              <a:t>What we’ve done</a:t>
+              <a:t>What We’ve Done</a:t>
             </a:r>
           </a:p>
         </p:txBody>
@@ -3981,12 +5091,19 @@
             <a:spLocks noGrp="1"/>
           </p:cNvSpPr>
           <p:nvPr>
-            <p:ph idx="1"/>
-          </p:nvPr>
-        </p:nvSpPr>
-        <p:spPr/>
-        <p:txBody>
-          <a:bodyPr/>
+            <p:ph idx="4294967295"/>
+          </p:nvPr>
+        </p:nvSpPr>
+        <p:spPr>
+          <a:xfrm>
+            <a:off x="373164" y="872359"/>
+            <a:ext cx="5505349" cy="5304604"/>
+          </a:xfrm>
+        </p:spPr>
+        <p:txBody>
+          <a:bodyPr>
+            <a:normAutofit lnSpcReduction="10000"/>
+          </a:bodyPr>
           <a:lstStyle/>
           <a:p>
             <a:r>
@@ -4040,14 +5157,14 @@
             <a:pPr lvl="2"/>
             <a:r>
               <a:rPr lang="en-GB" dirty="0"/>
-              <a:t>Possibly indicative of less smokers, more vaping</a:t>
+              <a:t>Possibly indicative of less smokers or more vaping?</a:t>
             </a:r>
           </a:p>
           <a:p>
             <a:pPr lvl="1"/>
             <a:r>
               <a:rPr lang="en-GB" dirty="0"/>
-              <a:t>Fireworks are collected in July and in </a:t>
+              <a:t>Fireworks are collected most in July and in </a:t>
             </a:r>
             <a:r>
               <a:rPr lang="en-GB" dirty="0" err="1"/>
@@ -4055,14 +5172,14 @@
             </a:r>
             <a:r>
               <a:rPr lang="en-GB" dirty="0"/>
-              <a:t> only </a:t>
+              <a:t> </a:t>
             </a:r>
           </a:p>
           <a:p>
             <a:pPr lvl="2"/>
             <a:r>
               <a:rPr lang="en-GB" dirty="0"/>
-              <a:t>indicative of 4 Jul celebrations</a:t>
+              <a:t>Possibly indicative of 4 Jul celebrations?</a:t>
             </a:r>
           </a:p>
           <a:p>
@@ -4071,6 +5188,42 @@
           </a:p>
         </p:txBody>
       </p:sp>
+      <p:pic>
+        <p:nvPicPr>
+          <p:cNvPr id="5" name="Picture 4" descr="A screenshot of a cell phone&#10;&#10;Description automatically generated">
+            <a:extLst>
+              <a:ext uri="{FF2B5EF4-FFF2-40B4-BE49-F238E27FC236}">
+                <a16:creationId xmlns:a16="http://schemas.microsoft.com/office/drawing/2014/main" id="{6D970FCF-106C-48C6-BF85-1A384A0C52A5}"/>
+              </a:ext>
+            </a:extLst>
+          </p:cNvPr>
+          <p:cNvPicPr>
+            <a:picLocks noChangeAspect="1"/>
+          </p:cNvPicPr>
+          <p:nvPr/>
+        </p:nvPicPr>
+        <p:blipFill>
+          <a:blip r:embed="rId3">
+            <a:extLst>
+              <a:ext uri="{28A0092B-C50C-407E-A947-70E740481C1C}">
+                <a14:useLocalDpi xmlns:a14="http://schemas.microsoft.com/office/drawing/2010/main" val="0"/>
+              </a:ext>
+            </a:extLst>
+          </a:blip>
+          <a:stretch>
+            <a:fillRect/>
+          </a:stretch>
+        </p:blipFill>
+        <p:spPr>
+          <a:xfrm>
+            <a:off x="6847538" y="3653367"/>
+            <a:ext cx="4971298" cy="3066294"/>
+          </a:xfrm>
+          <a:prstGeom prst="rect">
+            <a:avLst/>
+          </a:prstGeom>
+        </p:spPr>
+      </p:pic>
     </p:spTree>
     <p:extLst>
       <p:ext uri="{BB962C8B-B14F-4D97-AF65-F5344CB8AC3E}">
@@ -4142,15 +5295,95 @@
             <a:spLocks noGrp="1"/>
           </p:cNvSpPr>
           <p:nvPr>
-            <p:ph idx="1"/>
-          </p:nvPr>
-        </p:nvSpPr>
-        <p:spPr/>
-        <p:txBody>
-          <a:bodyPr/>
-          <a:lstStyle/>
-          <a:p>
-            <a:endParaRPr lang="en-GB"/>
+            <p:ph idx="4294967295"/>
+          </p:nvPr>
+        </p:nvSpPr>
+        <p:spPr>
+          <a:xfrm>
+            <a:off x="0" y="1825625"/>
+            <a:ext cx="10515600" cy="4351338"/>
+          </a:xfrm>
+        </p:spPr>
+        <p:txBody>
+          <a:bodyPr/>
+          <a:lstStyle/>
+          <a:p>
+            <a:r>
+              <a:rPr lang="en-GB" dirty="0"/>
+              <a:t>Exploring the ideas of</a:t>
+            </a:r>
+          </a:p>
+          <a:p>
+            <a:pPr lvl="1"/>
+            <a:r>
+              <a:rPr lang="en-GB" dirty="0"/>
+              <a:t>Event driven pollution</a:t>
+            </a:r>
+          </a:p>
+          <a:p>
+            <a:pPr lvl="2"/>
+            <a:r>
+              <a:rPr lang="en-GB" dirty="0"/>
+              <a:t>e.g. fireworks after 4</a:t>
+            </a:r>
+            <a:r>
+              <a:rPr lang="en-GB" baseline="30000" dirty="0"/>
+              <a:t>th</a:t>
+            </a:r>
+            <a:r>
+              <a:rPr lang="en-GB" dirty="0"/>
+              <a:t> July</a:t>
+            </a:r>
+          </a:p>
+          <a:p>
+            <a:pPr lvl="1"/>
+            <a:r>
+              <a:rPr lang="en-GB" dirty="0"/>
+              <a:t>Location driven pollution</a:t>
+            </a:r>
+          </a:p>
+          <a:p>
+            <a:pPr lvl="2"/>
+            <a:r>
+              <a:rPr lang="en-GB" dirty="0"/>
+              <a:t>e.g. fireworks recorded in North America and no where else</a:t>
+            </a:r>
+          </a:p>
+          <a:p>
+            <a:pPr lvl="1"/>
+            <a:r>
+              <a:rPr lang="en-GB" dirty="0"/>
+              <a:t>Item-pairing</a:t>
+            </a:r>
+          </a:p>
+          <a:p>
+            <a:pPr lvl="2"/>
+            <a:r>
+              <a:rPr lang="en-GB" dirty="0"/>
+              <a:t>E.g. </a:t>
+            </a:r>
+          </a:p>
+          <a:p>
+            <a:pPr lvl="1"/>
+            <a:r>
+              <a:rPr lang="en-GB" dirty="0"/>
+              <a:t>Building a model to predict…</a:t>
+            </a:r>
+          </a:p>
+          <a:p>
+            <a:pPr lvl="1"/>
+            <a:r>
+              <a:rPr lang="en-GB" dirty="0"/>
+              <a:t>Time Series?</a:t>
+            </a:r>
+          </a:p>
+          <a:p>
+            <a:pPr lvl="1"/>
+            <a:endParaRPr lang="en-GB" dirty="0"/>
+          </a:p>
+          <a:p>
+            <a:pPr lvl="1"/>
+            <a:endParaRPr lang="en-GB" dirty="0"/>
           </a:p>
         </p:txBody>
       </p:sp>
@@ -4460,4 +5693,299 @@
     </a:ext>
   </a:extLst>
 </a:theme>
+</file>
+
+<file path=ppt/theme/theme2.xml><?xml version="1.0" encoding="utf-8"?>
+<a:theme xmlns:a="http://schemas.openxmlformats.org/drawingml/2006/main" name="Office Theme">
+  <a:themeElements>
+    <a:clrScheme name="Office">
+      <a:dk1>
+        <a:sysClr val="windowText" lastClr="000000"/>
+      </a:dk1>
+      <a:lt1>
+        <a:sysClr val="window" lastClr="FFFFFF"/>
+      </a:lt1>
+      <a:dk2>
+        <a:srgbClr val="44546A"/>
+      </a:dk2>
+      <a:lt2>
+        <a:srgbClr val="E7E6E6"/>
+      </a:lt2>
+      <a:accent1>
+        <a:srgbClr val="4472C4"/>
+      </a:accent1>
+      <a:accent2>
+        <a:srgbClr val="ED7D31"/>
+      </a:accent2>
+      <a:accent3>
+        <a:srgbClr val="A5A5A5"/>
+      </a:accent3>
+      <a:accent4>
+        <a:srgbClr val="FFC000"/>
+      </a:accent4>
+      <a:accent5>
+        <a:srgbClr val="5B9BD5"/>
+      </a:accent5>
+      <a:accent6>
+        <a:srgbClr val="70AD47"/>
+      </a:accent6>
+      <a:hlink>
+        <a:srgbClr val="0563C1"/>
+      </a:hlink>
+      <a:folHlink>
+        <a:srgbClr val="954F72"/>
+      </a:folHlink>
+    </a:clrScheme>
+    <a:fontScheme name="Office">
+      <a:majorFont>
+        <a:latin typeface="Calibri Light" panose="020F0302020204030204"/>
+        <a:ea typeface=""/>
+        <a:cs typeface=""/>
+        <a:font script="Jpan" typeface="游ゴシック Light"/>
+        <a:font script="Hang" typeface="맑은 고딕"/>
+        <a:font script="Hans" typeface="等线 Light"/>
+        <a:font script="Hant" typeface="新細明體"/>
+        <a:font script="Arab" typeface="Times New Roman"/>
+        <a:font script="Hebr" typeface="Times New Roman"/>
+        <a:font script="Thai" typeface="Angsana New"/>
+        <a:font script="Ethi" typeface="Nyala"/>
+        <a:font script="Beng" typeface="Vrinda"/>
+        <a:font script="Gujr" typeface="Shruti"/>
+        <a:font script="Khmr" typeface="MoolBoran"/>
+        <a:font script="Knda" typeface="Tunga"/>
+        <a:font script="Guru" typeface="Raavi"/>
+        <a:font script="Cans" typeface="Euphemia"/>
+        <a:font script="Cher" typeface="Plantagenet Cherokee"/>
+        <a:font script="Yiii" typeface="Microsoft Yi Baiti"/>
+        <a:font script="Tibt" typeface="Microsoft Himalaya"/>
+        <a:font script="Thaa" typeface="MV Boli"/>
+        <a:font script="Deva" typeface="Mangal"/>
+        <a:font script="Telu" typeface="Gautami"/>
+        <a:font script="Taml" typeface="Latha"/>
+        <a:font script="Syrc" typeface="Estrangelo Edessa"/>
+        <a:font script="Orya" typeface="Kalinga"/>
+        <a:font script="Mlym" typeface="Kartika"/>
+        <a:font script="Laoo" typeface="DokChampa"/>
+        <a:font script="Sinh" typeface="Iskoola Pota"/>
+        <a:font script="Mong" typeface="Mongolian Baiti"/>
+        <a:font script="Viet" typeface="Times New Roman"/>
+        <a:font script="Uigh" typeface="Microsoft Uighur"/>
+        <a:font script="Geor" typeface="Sylfaen"/>
+        <a:font script="Armn" typeface="Arial"/>
+        <a:font script="Bugi" typeface="Leelawadee UI"/>
+        <a:font script="Bopo" typeface="Microsoft JhengHei"/>
+        <a:font script="Java" typeface="Javanese Text"/>
+        <a:font script="Lisu" typeface="Segoe UI"/>
+        <a:font script="Mymr" typeface="Myanmar Text"/>
+        <a:font script="Nkoo" typeface="Ebrima"/>
+        <a:font script="Olck" typeface="Nirmala UI"/>
+        <a:font script="Osma" typeface="Ebrima"/>
+        <a:font script="Phag" typeface="Phagspa"/>
+        <a:font script="Syrn" typeface="Estrangelo Edessa"/>
+        <a:font script="Syrj" typeface="Estrangelo Edessa"/>
+        <a:font script="Syre" typeface="Estrangelo Edessa"/>
+        <a:font script="Sora" typeface="Nirmala UI"/>
+        <a:font script="Tale" typeface="Microsoft Tai Le"/>
+        <a:font script="Talu" typeface="Microsoft New Tai Lue"/>
+        <a:font script="Tfng" typeface="Ebrima"/>
+      </a:majorFont>
+      <a:minorFont>
+        <a:latin typeface="Calibri" panose="020F0502020204030204"/>
+        <a:ea typeface=""/>
+        <a:cs typeface=""/>
+        <a:font script="Jpan" typeface="游ゴシック"/>
+        <a:font script="Hang" typeface="맑은 고딕"/>
+        <a:font script="Hans" typeface="等线"/>
+        <a:font script="Hant" typeface="新細明體"/>
+        <a:font script="Arab" typeface="Arial"/>
+        <a:font script="Hebr" typeface="Arial"/>
+        <a:font script="Thai" typeface="Cordia New"/>
+        <a:font script="Ethi" typeface="Nyala"/>
+        <a:font script="Beng" typeface="Vrinda"/>
+        <a:font script="Gujr" typeface="Shruti"/>
+        <a:font script="Khmr" typeface="DaunPenh"/>
+        <a:font script="Knda" typeface="Tunga"/>
+        <a:font script="Guru" typeface="Raavi"/>
+        <a:font script="Cans" typeface="Euphemia"/>
+        <a:font script="Cher" typeface="Plantagenet Cherokee"/>
+        <a:font script="Yiii" typeface="Microsoft Yi Baiti"/>
+        <a:font script="Tibt" typeface="Microsoft Himalaya"/>
+        <a:font script="Thaa" typeface="MV Boli"/>
+        <a:font script="Deva" typeface="Mangal"/>
+        <a:font script="Telu" typeface="Gautami"/>
+        <a:font script="Taml" typeface="Latha"/>
+        <a:font script="Syrc" typeface="Estrangelo Edessa"/>
+        <a:font script="Orya" typeface="Kalinga"/>
+        <a:font script="Mlym" typeface="Kartika"/>
+        <a:font script="Laoo" typeface="DokChampa"/>
+        <a:font script="Sinh" typeface="Iskoola Pota"/>
+        <a:font script="Mong" typeface="Mongolian Baiti"/>
+        <a:font script="Viet" typeface="Arial"/>
+        <a:font script="Uigh" typeface="Microsoft Uighur"/>
+        <a:font script="Geor" typeface="Sylfaen"/>
+        <a:font script="Armn" typeface="Arial"/>
+        <a:font script="Bugi" typeface="Leelawadee UI"/>
+        <a:font script="Bopo" typeface="Microsoft JhengHei"/>
+        <a:font script="Java" typeface="Javanese Text"/>
+        <a:font script="Lisu" typeface="Segoe UI"/>
+        <a:font script="Mymr" typeface="Myanmar Text"/>
+        <a:font script="Nkoo" typeface="Ebrima"/>
+        <a:font script="Olck" typeface="Nirmala UI"/>
+        <a:font script="Osma" typeface="Ebrima"/>
+        <a:font script="Phag" typeface="Phagspa"/>
+        <a:font script="Syrn" typeface="Estrangelo Edessa"/>
+        <a:font script="Syrj" typeface="Estrangelo Edessa"/>
+        <a:font script="Syre" typeface="Estrangelo Edessa"/>
+        <a:font script="Sora" typeface="Nirmala UI"/>
+        <a:font script="Tale" typeface="Microsoft Tai Le"/>
+        <a:font script="Talu" typeface="Microsoft New Tai Lue"/>
+        <a:font script="Tfng" typeface="Ebrima"/>
+      </a:minorFont>
+    </a:fontScheme>
+    <a:fmtScheme name="Office">
+      <a:fillStyleLst>
+        <a:solidFill>
+          <a:schemeClr val="phClr"/>
+        </a:solidFill>
+        <a:gradFill rotWithShape="1">
+          <a:gsLst>
+            <a:gs pos="0">
+              <a:schemeClr val="phClr">
+                <a:lumMod val="110000"/>
+                <a:satMod val="105000"/>
+                <a:tint val="67000"/>
+              </a:schemeClr>
+            </a:gs>
+            <a:gs pos="50000">
+              <a:schemeClr val="phClr">
+                <a:lumMod val="105000"/>
+                <a:satMod val="103000"/>
+                <a:tint val="73000"/>
+              </a:schemeClr>
+            </a:gs>
+            <a:gs pos="100000">
+              <a:schemeClr val="phClr">
+                <a:lumMod val="105000"/>
+                <a:satMod val="109000"/>
+                <a:tint val="81000"/>
+              </a:schemeClr>
+            </a:gs>
+          </a:gsLst>
+          <a:lin ang="5400000" scaled="0"/>
+        </a:gradFill>
+        <a:gradFill rotWithShape="1">
+          <a:gsLst>
+            <a:gs pos="0">
+              <a:schemeClr val="phClr">
+                <a:satMod val="103000"/>
+                <a:lumMod val="102000"/>
+                <a:tint val="94000"/>
+              </a:schemeClr>
+            </a:gs>
+            <a:gs pos="50000">
+              <a:schemeClr val="phClr">
+                <a:satMod val="110000"/>
+                <a:lumMod val="100000"/>
+                <a:shade val="100000"/>
+              </a:schemeClr>
+            </a:gs>
+            <a:gs pos="100000">
+              <a:schemeClr val="phClr">
+                <a:lumMod val="99000"/>
+                <a:satMod val="120000"/>
+                <a:shade val="78000"/>
+              </a:schemeClr>
+            </a:gs>
+          </a:gsLst>
+          <a:lin ang="5400000" scaled="0"/>
+        </a:gradFill>
+      </a:fillStyleLst>
+      <a:lnStyleLst>
+        <a:ln w="6350" cap="flat" cmpd="sng" algn="ctr">
+          <a:solidFill>
+            <a:schemeClr val="phClr"/>
+          </a:solidFill>
+          <a:prstDash val="solid"/>
+          <a:miter lim="800000"/>
+        </a:ln>
+        <a:ln w="12700" cap="flat" cmpd="sng" algn="ctr">
+          <a:solidFill>
+            <a:schemeClr val="phClr"/>
+          </a:solidFill>
+          <a:prstDash val="solid"/>
+          <a:miter lim="800000"/>
+        </a:ln>
+        <a:ln w="19050" cap="flat" cmpd="sng" algn="ctr">
+          <a:solidFill>
+            <a:schemeClr val="phClr"/>
+          </a:solidFill>
+          <a:prstDash val="solid"/>
+          <a:miter lim="800000"/>
+        </a:ln>
+      </a:lnStyleLst>
+      <a:effectStyleLst>
+        <a:effectStyle>
+          <a:effectLst/>
+        </a:effectStyle>
+        <a:effectStyle>
+          <a:effectLst/>
+        </a:effectStyle>
+        <a:effectStyle>
+          <a:effectLst>
+            <a:outerShdw blurRad="57150" dist="19050" dir="5400000" algn="ctr" rotWithShape="0">
+              <a:srgbClr val="000000">
+                <a:alpha val="63000"/>
+              </a:srgbClr>
+            </a:outerShdw>
+          </a:effectLst>
+        </a:effectStyle>
+      </a:effectStyleLst>
+      <a:bgFillStyleLst>
+        <a:solidFill>
+          <a:schemeClr val="phClr"/>
+        </a:solidFill>
+        <a:solidFill>
+          <a:schemeClr val="phClr">
+            <a:tint val="95000"/>
+            <a:satMod val="170000"/>
+          </a:schemeClr>
+        </a:solidFill>
+        <a:gradFill rotWithShape="1">
+          <a:gsLst>
+            <a:gs pos="0">
+              <a:schemeClr val="phClr">
+                <a:tint val="93000"/>
+                <a:satMod val="150000"/>
+                <a:shade val="98000"/>
+                <a:lumMod val="102000"/>
+              </a:schemeClr>
+            </a:gs>
+            <a:gs pos="50000">
+              <a:schemeClr val="phClr">
+                <a:tint val="98000"/>
+                <a:satMod val="130000"/>
+                <a:shade val="90000"/>
+                <a:lumMod val="103000"/>
+              </a:schemeClr>
+            </a:gs>
+            <a:gs pos="100000">
+              <a:schemeClr val="phClr">
+                <a:shade val="63000"/>
+                <a:satMod val="120000"/>
+              </a:schemeClr>
+            </a:gs>
+          </a:gsLst>
+          <a:lin ang="5400000" scaled="0"/>
+        </a:gradFill>
+      </a:bgFillStyleLst>
+    </a:fmtScheme>
+  </a:themeElements>
+  <a:objectDefaults/>
+  <a:extraClrSchemeLst/>
+  <a:extLst>
+    <a:ext uri="{05A4C25C-085E-4340-85A3-A5531E510DB2}">
+      <thm15:themeFamily xmlns:thm15="http://schemas.microsoft.com/office/thememl/2012/main" name="Office Theme" id="{62F939B6-93AF-4DB8-9C6B-D6C7DFDC589F}" vid="{4A3C46E8-61CC-4603-A589-7422A47A8E4A}"/>
+    </a:ext>
+  </a:extLst>
+</a:theme>
 </file>
</xml_diff>